<commit_message>
menerjemahkan lagi beberapa kata ya
</commit_message>
<xml_diff>
--- a/kedokteran/anamnesis-dan-pemeriksaan-fisik/1-dasar-kecakapan-klinis-anamnesis.pptx
+++ b/kedokteran/anamnesis-dan-pemeriksaan-fisik/1-dasar-kecakapan-klinis-anamnesis.pptx
@@ -218,7 +218,7 @@
           <a:p>
             <a:fld id="{A5B8662C-F6D1-49A3-84FA-3B4D84B4DFC0}" type="datetimeFigureOut">
               <a:rPr lang="en-ID" smtClean="0"/>
-              <a:t>14/04/2025</a:t>
+              <a:t>18/04/2025</a:t>
             </a:fld>
             <a:endParaRPr lang="en-ID"/>
           </a:p>
@@ -11199,7 +11199,7 @@
           <a:p>
             <a:fld id="{387CE664-B550-4B05-B21E-54FE072B0478}" type="datetimeFigureOut">
               <a:rPr lang="en-ID" smtClean="0"/>
-              <a:t>14/04/2025</a:t>
+              <a:t>18/04/2025</a:t>
             </a:fld>
             <a:endParaRPr lang="en-ID"/>
           </a:p>
@@ -11399,7 +11399,7 @@
           <a:p>
             <a:fld id="{387CE664-B550-4B05-B21E-54FE072B0478}" type="datetimeFigureOut">
               <a:rPr lang="en-ID" smtClean="0"/>
-              <a:t>14/04/2025</a:t>
+              <a:t>18/04/2025</a:t>
             </a:fld>
             <a:endParaRPr lang="en-ID"/>
           </a:p>
@@ -11609,7 +11609,7 @@
           <a:p>
             <a:fld id="{387CE664-B550-4B05-B21E-54FE072B0478}" type="datetimeFigureOut">
               <a:rPr lang="en-ID" smtClean="0"/>
-              <a:t>14/04/2025</a:t>
+              <a:t>18/04/2025</a:t>
             </a:fld>
             <a:endParaRPr lang="en-ID"/>
           </a:p>
@@ -11809,7 +11809,7 @@
           <a:p>
             <a:fld id="{387CE664-B550-4B05-B21E-54FE072B0478}" type="datetimeFigureOut">
               <a:rPr lang="en-ID" smtClean="0"/>
-              <a:t>14/04/2025</a:t>
+              <a:t>18/04/2025</a:t>
             </a:fld>
             <a:endParaRPr lang="en-ID"/>
           </a:p>
@@ -12085,7 +12085,7 @@
           <a:p>
             <a:fld id="{387CE664-B550-4B05-B21E-54FE072B0478}" type="datetimeFigureOut">
               <a:rPr lang="en-ID" smtClean="0"/>
-              <a:t>14/04/2025</a:t>
+              <a:t>18/04/2025</a:t>
             </a:fld>
             <a:endParaRPr lang="en-ID"/>
           </a:p>
@@ -12353,7 +12353,7 @@
           <a:p>
             <a:fld id="{387CE664-B550-4B05-B21E-54FE072B0478}" type="datetimeFigureOut">
               <a:rPr lang="en-ID" smtClean="0"/>
-              <a:t>14/04/2025</a:t>
+              <a:t>18/04/2025</a:t>
             </a:fld>
             <a:endParaRPr lang="en-ID"/>
           </a:p>
@@ -12768,7 +12768,7 @@
           <a:p>
             <a:fld id="{387CE664-B550-4B05-B21E-54FE072B0478}" type="datetimeFigureOut">
               <a:rPr lang="en-ID" smtClean="0"/>
-              <a:t>14/04/2025</a:t>
+              <a:t>18/04/2025</a:t>
             </a:fld>
             <a:endParaRPr lang="en-ID"/>
           </a:p>
@@ -12910,7 +12910,7 @@
           <a:p>
             <a:fld id="{387CE664-B550-4B05-B21E-54FE072B0478}" type="datetimeFigureOut">
               <a:rPr lang="en-ID" smtClean="0"/>
-              <a:t>14/04/2025</a:t>
+              <a:t>18/04/2025</a:t>
             </a:fld>
             <a:endParaRPr lang="en-ID"/>
           </a:p>
@@ -13023,7 +13023,7 @@
           <a:p>
             <a:fld id="{387CE664-B550-4B05-B21E-54FE072B0478}" type="datetimeFigureOut">
               <a:rPr lang="en-ID" smtClean="0"/>
-              <a:t>14/04/2025</a:t>
+              <a:t>18/04/2025</a:t>
             </a:fld>
             <a:endParaRPr lang="en-ID"/>
           </a:p>
@@ -13336,7 +13336,7 @@
           <a:p>
             <a:fld id="{387CE664-B550-4B05-B21E-54FE072B0478}" type="datetimeFigureOut">
               <a:rPr lang="en-ID" smtClean="0"/>
-              <a:t>14/04/2025</a:t>
+              <a:t>18/04/2025</a:t>
             </a:fld>
             <a:endParaRPr lang="en-ID"/>
           </a:p>
@@ -13625,7 +13625,7 @@
           <a:p>
             <a:fld id="{387CE664-B550-4B05-B21E-54FE072B0478}" type="datetimeFigureOut">
               <a:rPr lang="en-ID" smtClean="0"/>
-              <a:t>14/04/2025</a:t>
+              <a:t>18/04/2025</a:t>
             </a:fld>
             <a:endParaRPr lang="en-ID"/>
           </a:p>
@@ -13868,7 +13868,7 @@
           <a:p>
             <a:fld id="{387CE664-B550-4B05-B21E-54FE072B0478}" type="datetimeFigureOut">
               <a:rPr lang="en-ID" smtClean="0"/>
-              <a:t>14/04/2025</a:t>
+              <a:t>18/04/2025</a:t>
             </a:fld>
             <a:endParaRPr lang="en-ID"/>
           </a:p>

</xml_diff>